<commit_message>
Updates involving Revisions #1
</commit_message>
<xml_diff>
--- a/Figures/Figure 2.pptx
+++ b/Figures/Figure 2.pptx
@@ -260,7 +260,7 @@
           <a:p>
             <a:fld id="{D2C2D0F7-05C5-48CE-8D0B-123D6605B773}" type="datetimeFigureOut">
               <a:rPr lang="en-US" smtClean="0"/>
-              <a:t>11/2/2021</a:t>
+              <a:t>11/10/2021</a:t>
             </a:fld>
             <a:endParaRPr lang="en-US"/>
           </a:p>
@@ -458,7 +458,7 @@
           <a:p>
             <a:fld id="{D2C2D0F7-05C5-48CE-8D0B-123D6605B773}" type="datetimeFigureOut">
               <a:rPr lang="en-US" smtClean="0"/>
-              <a:t>11/2/2021</a:t>
+              <a:t>11/10/2021</a:t>
             </a:fld>
             <a:endParaRPr lang="en-US"/>
           </a:p>
@@ -666,7 +666,7 @@
           <a:p>
             <a:fld id="{D2C2D0F7-05C5-48CE-8D0B-123D6605B773}" type="datetimeFigureOut">
               <a:rPr lang="en-US" smtClean="0"/>
-              <a:t>11/2/2021</a:t>
+              <a:t>11/10/2021</a:t>
             </a:fld>
             <a:endParaRPr lang="en-US"/>
           </a:p>
@@ -864,7 +864,7 @@
           <a:p>
             <a:fld id="{D2C2D0F7-05C5-48CE-8D0B-123D6605B773}" type="datetimeFigureOut">
               <a:rPr lang="en-US" smtClean="0"/>
-              <a:t>11/2/2021</a:t>
+              <a:t>11/10/2021</a:t>
             </a:fld>
             <a:endParaRPr lang="en-US"/>
           </a:p>
@@ -1139,7 +1139,7 @@
           <a:p>
             <a:fld id="{D2C2D0F7-05C5-48CE-8D0B-123D6605B773}" type="datetimeFigureOut">
               <a:rPr lang="en-US" smtClean="0"/>
-              <a:t>11/2/2021</a:t>
+              <a:t>11/10/2021</a:t>
             </a:fld>
             <a:endParaRPr lang="en-US"/>
           </a:p>
@@ -1404,7 +1404,7 @@
           <a:p>
             <a:fld id="{D2C2D0F7-05C5-48CE-8D0B-123D6605B773}" type="datetimeFigureOut">
               <a:rPr lang="en-US" smtClean="0"/>
-              <a:t>11/2/2021</a:t>
+              <a:t>11/10/2021</a:t>
             </a:fld>
             <a:endParaRPr lang="en-US"/>
           </a:p>
@@ -1816,7 +1816,7 @@
           <a:p>
             <a:fld id="{D2C2D0F7-05C5-48CE-8D0B-123D6605B773}" type="datetimeFigureOut">
               <a:rPr lang="en-US" smtClean="0"/>
-              <a:t>11/2/2021</a:t>
+              <a:t>11/10/2021</a:t>
             </a:fld>
             <a:endParaRPr lang="en-US"/>
           </a:p>
@@ -1957,7 +1957,7 @@
           <a:p>
             <a:fld id="{D2C2D0F7-05C5-48CE-8D0B-123D6605B773}" type="datetimeFigureOut">
               <a:rPr lang="en-US" smtClean="0"/>
-              <a:t>11/2/2021</a:t>
+              <a:t>11/10/2021</a:t>
             </a:fld>
             <a:endParaRPr lang="en-US"/>
           </a:p>
@@ -2070,7 +2070,7 @@
           <a:p>
             <a:fld id="{D2C2D0F7-05C5-48CE-8D0B-123D6605B773}" type="datetimeFigureOut">
               <a:rPr lang="en-US" smtClean="0"/>
-              <a:t>11/2/2021</a:t>
+              <a:t>11/10/2021</a:t>
             </a:fld>
             <a:endParaRPr lang="en-US"/>
           </a:p>
@@ -2381,7 +2381,7 @@
           <a:p>
             <a:fld id="{D2C2D0F7-05C5-48CE-8D0B-123D6605B773}" type="datetimeFigureOut">
               <a:rPr lang="en-US" smtClean="0"/>
-              <a:t>11/2/2021</a:t>
+              <a:t>11/10/2021</a:t>
             </a:fld>
             <a:endParaRPr lang="en-US"/>
           </a:p>
@@ -2669,7 +2669,7 @@
           <a:p>
             <a:fld id="{D2C2D0F7-05C5-48CE-8D0B-123D6605B773}" type="datetimeFigureOut">
               <a:rPr lang="en-US" smtClean="0"/>
-              <a:t>11/2/2021</a:t>
+              <a:t>11/10/2021</a:t>
             </a:fld>
             <a:endParaRPr lang="en-US"/>
           </a:p>
@@ -2910,7 +2910,7 @@
           <a:p>
             <a:fld id="{D2C2D0F7-05C5-48CE-8D0B-123D6605B773}" type="datetimeFigureOut">
               <a:rPr lang="en-US" smtClean="0"/>
-              <a:t>11/2/2021</a:t>
+              <a:t>11/10/2021</a:t>
             </a:fld>
             <a:endParaRPr lang="en-US"/>
           </a:p>
@@ -3329,10 +3329,10 @@
       </p:grpSpPr>
       <p:pic>
         <p:nvPicPr>
-          <p:cNvPr id="3" name="Picture 2">
-            <a:extLst>
-              <a:ext uri="{FF2B5EF4-FFF2-40B4-BE49-F238E27FC236}">
-                <a16:creationId xmlns:a16="http://schemas.microsoft.com/office/drawing/2014/main" id="{0D81D123-5EA7-42CA-97D6-ADCE3CAEEC5D}"/>
+          <p:cNvPr id="29" name="Picture 28">
+            <a:extLst>
+              <a:ext uri="{FF2B5EF4-FFF2-40B4-BE49-F238E27FC236}">
+                <a16:creationId xmlns:a16="http://schemas.microsoft.com/office/drawing/2014/main" id="{AC11C4F1-10E7-48C5-BC1F-FD965F07463E}"/>
               </a:ext>
             </a:extLst>
           </p:cNvPr>
@@ -3349,8 +3349,38 @@
         </p:blipFill>
         <p:spPr>
           <a:xfrm rot="16200000">
-            <a:off x="7851751" y="1698271"/>
-            <a:ext cx="786753" cy="2236719"/>
+            <a:off x="4496837" y="1180556"/>
+            <a:ext cx="549990" cy="3358604"/>
+          </a:xfrm>
+          <a:prstGeom prst="rect">
+            <a:avLst/>
+          </a:prstGeom>
+        </p:spPr>
+      </p:pic>
+      <p:pic>
+        <p:nvPicPr>
+          <p:cNvPr id="3" name="Picture 2">
+            <a:extLst>
+              <a:ext uri="{FF2B5EF4-FFF2-40B4-BE49-F238E27FC236}">
+                <a16:creationId xmlns:a16="http://schemas.microsoft.com/office/drawing/2014/main" id="{0D81D123-5EA7-42CA-97D6-ADCE3CAEEC5D}"/>
+              </a:ext>
+            </a:extLst>
+          </p:cNvPr>
+          <p:cNvPicPr>
+            <a:picLocks noChangeAspect="1"/>
+          </p:cNvPicPr>
+          <p:nvPr/>
+        </p:nvPicPr>
+        <p:blipFill>
+          <a:blip r:embed="rId2"/>
+          <a:stretch>
+            <a:fillRect/>
+          </a:stretch>
+        </p:blipFill>
+        <p:spPr>
+          <a:xfrm rot="16200000">
+            <a:off x="8048290" y="1391022"/>
+            <a:ext cx="548640" cy="2875824"/>
           </a:xfrm>
           <a:prstGeom prst="rect">
             <a:avLst/>
@@ -3959,86 +3989,6 @@
           </a:p>
         </p:txBody>
       </p:sp>
-      <p:cxnSp>
-        <p:nvCxnSpPr>
-          <p:cNvPr id="20" name="Straight Connector 19">
-            <a:extLst>
-              <a:ext uri="{FF2B5EF4-FFF2-40B4-BE49-F238E27FC236}">
-                <a16:creationId xmlns:a16="http://schemas.microsoft.com/office/drawing/2014/main" id="{5F0C173A-216F-4AF6-BEF6-BF930A40E78D}"/>
-              </a:ext>
-            </a:extLst>
-          </p:cNvPr>
-          <p:cNvCxnSpPr>
-            <a:cxnSpLocks/>
-          </p:cNvCxnSpPr>
-          <p:nvPr/>
-        </p:nvCxnSpPr>
-        <p:spPr>
-          <a:xfrm>
-            <a:off x="6843700" y="1709999"/>
-            <a:ext cx="2969725" cy="0"/>
-          </a:xfrm>
-          <a:prstGeom prst="line">
-            <a:avLst/>
-          </a:prstGeom>
-          <a:ln w="28575">
-            <a:solidFill>
-              <a:schemeClr val="tx1"/>
-            </a:solidFill>
-            <a:prstDash val="sysDot"/>
-          </a:ln>
-        </p:spPr>
-        <p:style>
-          <a:lnRef idx="1">
-            <a:schemeClr val="accent1"/>
-          </a:lnRef>
-          <a:fillRef idx="0">
-            <a:schemeClr val="accent1"/>
-          </a:fillRef>
-          <a:effectRef idx="0">
-            <a:schemeClr val="accent1"/>
-          </a:effectRef>
-          <a:fontRef idx="minor">
-            <a:schemeClr val="tx1"/>
-          </a:fontRef>
-        </p:style>
-      </p:cxnSp>
-      <p:sp>
-        <p:nvSpPr>
-          <p:cNvPr id="22" name="TextBox 21">
-            <a:extLst>
-              <a:ext uri="{FF2B5EF4-FFF2-40B4-BE49-F238E27FC236}">
-                <a16:creationId xmlns:a16="http://schemas.microsoft.com/office/drawing/2014/main" id="{3406259A-F9C6-435C-B274-598F925C020B}"/>
-              </a:ext>
-            </a:extLst>
-          </p:cNvPr>
-          <p:cNvSpPr txBox="1"/>
-          <p:nvPr/>
-        </p:nvSpPr>
-        <p:spPr>
-          <a:xfrm>
-            <a:off x="6928421" y="1285949"/>
-            <a:ext cx="4159665" cy="369332"/>
-          </a:xfrm>
-          <a:prstGeom prst="rect">
-            <a:avLst/>
-          </a:prstGeom>
-          <a:noFill/>
-        </p:spPr>
-        <p:txBody>
-          <a:bodyPr wrap="none" rtlCol="0">
-            <a:spAutoFit/>
-          </a:bodyPr>
-          <a:lstStyle/>
-          <a:p>
-            <a:r>
-              <a:rPr lang="de-DE" dirty="0"/>
-              <a:t>Speed*Occlusion Duration (0.5, 0.6, 0.7s)</a:t>
-            </a:r>
-            <a:endParaRPr lang="en-US" dirty="0"/>
-          </a:p>
-        </p:txBody>
-      </p:sp>
       <p:sp>
         <p:nvSpPr>
           <p:cNvPr id="24" name="Oval 23">
@@ -4384,8 +4334,8 @@
         </p:nvSpPr>
         <p:spPr>
           <a:xfrm>
-            <a:off x="7772401" y="3030569"/>
-            <a:ext cx="945452" cy="369332"/>
+            <a:off x="7185142" y="3021806"/>
+            <a:ext cx="2325637" cy="369332"/>
           </a:xfrm>
           <a:prstGeom prst="rect">
             <a:avLst/>
@@ -4400,7 +4350,79 @@
           <a:p>
             <a:r>
               <a:rPr lang="de-DE" dirty="0"/>
-              <a:t>invisible</a:t>
+              <a:t>Invisible (0.5, 0.6, 0.7s)</a:t>
+            </a:r>
+            <a:endParaRPr lang="en-US" dirty="0"/>
+          </a:p>
+        </p:txBody>
+      </p:sp>
+      <p:sp>
+        <p:nvSpPr>
+          <p:cNvPr id="30" name="TextBox 29">
+            <a:extLst>
+              <a:ext uri="{FF2B5EF4-FFF2-40B4-BE49-F238E27FC236}">
+                <a16:creationId xmlns:a16="http://schemas.microsoft.com/office/drawing/2014/main" id="{B6FB6F14-AE8E-4F0A-BC9D-C1F97C0EB15D}"/>
+              </a:ext>
+            </a:extLst>
+          </p:cNvPr>
+          <p:cNvSpPr txBox="1"/>
+          <p:nvPr/>
+        </p:nvSpPr>
+        <p:spPr>
+          <a:xfrm>
+            <a:off x="3994441" y="3033968"/>
+            <a:ext cx="1350050" cy="369332"/>
+          </a:xfrm>
+          <a:prstGeom prst="rect">
+            <a:avLst/>
+          </a:prstGeom>
+          <a:noFill/>
+        </p:spPr>
+        <p:txBody>
+          <a:bodyPr wrap="none" rtlCol="0">
+            <a:spAutoFit/>
+          </a:bodyPr>
+          <a:lstStyle/>
+          <a:p>
+            <a:r>
+              <a:rPr lang="de-DE" dirty="0"/>
+              <a:t>visible (0.5s)</a:t>
+            </a:r>
+            <a:endParaRPr lang="en-US" dirty="0"/>
+          </a:p>
+        </p:txBody>
+      </p:sp>
+      <p:sp>
+        <p:nvSpPr>
+          <p:cNvPr id="33" name="TextBox 32">
+            <a:extLst>
+              <a:ext uri="{FF2B5EF4-FFF2-40B4-BE49-F238E27FC236}">
+                <a16:creationId xmlns:a16="http://schemas.microsoft.com/office/drawing/2014/main" id="{2A5E5647-CB9E-43A1-B58D-9A7440769E10}"/>
+              </a:ext>
+            </a:extLst>
+          </p:cNvPr>
+          <p:cNvSpPr txBox="1"/>
+          <p:nvPr/>
+        </p:nvSpPr>
+        <p:spPr>
+          <a:xfrm>
+            <a:off x="6737843" y="1231296"/>
+            <a:ext cx="1679495" cy="646331"/>
+          </a:xfrm>
+          <a:prstGeom prst="rect">
+            <a:avLst/>
+          </a:prstGeom>
+          <a:noFill/>
+        </p:spPr>
+        <p:txBody>
+          <a:bodyPr wrap="square" rtlCol="0">
+            <a:spAutoFit/>
+          </a:bodyPr>
+          <a:lstStyle/>
+          <a:p>
+            <a:r>
+              <a:rPr lang="de-DE" dirty="0"/>
+              <a:t>Point of Disappearance</a:t>
             </a:r>
             <a:endParaRPr lang="en-US" dirty="0"/>
           </a:p>

</xml_diff>

<commit_message>
Submission Stage 2 RR
</commit_message>
<xml_diff>
--- a/Figures/Figure 2.pptx
+++ b/Figures/Figure 2.pptx
@@ -7,6 +7,7 @@
   <p:sldIdLst>
     <p:sldId id="257" r:id="rId2"/>
     <p:sldId id="256" r:id="rId3"/>
+    <p:sldId id="258" r:id="rId4"/>
   </p:sldIdLst>
   <p:sldSz cx="12192000" cy="6858000"/>
   <p:notesSz cx="6858000" cy="9144000"/>
@@ -260,7 +261,7 @@
           <a:p>
             <a:fld id="{D2C2D0F7-05C5-48CE-8D0B-123D6605B773}" type="datetimeFigureOut">
               <a:rPr lang="en-US" smtClean="0"/>
-              <a:t>11/10/2021</a:t>
+              <a:t>11/1/2023</a:t>
             </a:fld>
             <a:endParaRPr lang="en-US"/>
           </a:p>
@@ -458,7 +459,7 @@
           <a:p>
             <a:fld id="{D2C2D0F7-05C5-48CE-8D0B-123D6605B773}" type="datetimeFigureOut">
               <a:rPr lang="en-US" smtClean="0"/>
-              <a:t>11/10/2021</a:t>
+              <a:t>11/1/2023</a:t>
             </a:fld>
             <a:endParaRPr lang="en-US"/>
           </a:p>
@@ -666,7 +667,7 @@
           <a:p>
             <a:fld id="{D2C2D0F7-05C5-48CE-8D0B-123D6605B773}" type="datetimeFigureOut">
               <a:rPr lang="en-US" smtClean="0"/>
-              <a:t>11/10/2021</a:t>
+              <a:t>11/1/2023</a:t>
             </a:fld>
             <a:endParaRPr lang="en-US"/>
           </a:p>
@@ -864,7 +865,7 @@
           <a:p>
             <a:fld id="{D2C2D0F7-05C5-48CE-8D0B-123D6605B773}" type="datetimeFigureOut">
               <a:rPr lang="en-US" smtClean="0"/>
-              <a:t>11/10/2021</a:t>
+              <a:t>11/1/2023</a:t>
             </a:fld>
             <a:endParaRPr lang="en-US"/>
           </a:p>
@@ -1139,7 +1140,7 @@
           <a:p>
             <a:fld id="{D2C2D0F7-05C5-48CE-8D0B-123D6605B773}" type="datetimeFigureOut">
               <a:rPr lang="en-US" smtClean="0"/>
-              <a:t>11/10/2021</a:t>
+              <a:t>11/1/2023</a:t>
             </a:fld>
             <a:endParaRPr lang="en-US"/>
           </a:p>
@@ -1404,7 +1405,7 @@
           <a:p>
             <a:fld id="{D2C2D0F7-05C5-48CE-8D0B-123D6605B773}" type="datetimeFigureOut">
               <a:rPr lang="en-US" smtClean="0"/>
-              <a:t>11/10/2021</a:t>
+              <a:t>11/1/2023</a:t>
             </a:fld>
             <a:endParaRPr lang="en-US"/>
           </a:p>
@@ -1816,7 +1817,7 @@
           <a:p>
             <a:fld id="{D2C2D0F7-05C5-48CE-8D0B-123D6605B773}" type="datetimeFigureOut">
               <a:rPr lang="en-US" smtClean="0"/>
-              <a:t>11/10/2021</a:t>
+              <a:t>11/1/2023</a:t>
             </a:fld>
             <a:endParaRPr lang="en-US"/>
           </a:p>
@@ -1957,7 +1958,7 @@
           <a:p>
             <a:fld id="{D2C2D0F7-05C5-48CE-8D0B-123D6605B773}" type="datetimeFigureOut">
               <a:rPr lang="en-US" smtClean="0"/>
-              <a:t>11/10/2021</a:t>
+              <a:t>11/1/2023</a:t>
             </a:fld>
             <a:endParaRPr lang="en-US"/>
           </a:p>
@@ -2070,7 +2071,7 @@
           <a:p>
             <a:fld id="{D2C2D0F7-05C5-48CE-8D0B-123D6605B773}" type="datetimeFigureOut">
               <a:rPr lang="en-US" smtClean="0"/>
-              <a:t>11/10/2021</a:t>
+              <a:t>11/1/2023</a:t>
             </a:fld>
             <a:endParaRPr lang="en-US"/>
           </a:p>
@@ -2381,7 +2382,7 @@
           <a:p>
             <a:fld id="{D2C2D0F7-05C5-48CE-8D0B-123D6605B773}" type="datetimeFigureOut">
               <a:rPr lang="en-US" smtClean="0"/>
-              <a:t>11/10/2021</a:t>
+              <a:t>11/1/2023</a:t>
             </a:fld>
             <a:endParaRPr lang="en-US"/>
           </a:p>
@@ -2669,7 +2670,7 @@
           <a:p>
             <a:fld id="{D2C2D0F7-05C5-48CE-8D0B-123D6605B773}" type="datetimeFigureOut">
               <a:rPr lang="en-US" smtClean="0"/>
-              <a:t>11/10/2021</a:t>
+              <a:t>11/1/2023</a:t>
             </a:fld>
             <a:endParaRPr lang="en-US"/>
           </a:p>
@@ -2910,7 +2911,7 @@
           <a:p>
             <a:fld id="{D2C2D0F7-05C5-48CE-8D0B-123D6605B773}" type="datetimeFigureOut">
               <a:rPr lang="en-US" smtClean="0"/>
-              <a:t>11/10/2021</a:t>
+              <a:t>11/1/2023</a:t>
             </a:fld>
             <a:endParaRPr lang="en-US"/>
           </a:p>
@@ -4920,6 +4921,395 @@
 </p:sld>
 </file>
 
+<file path=ppt/slides/slide3.xml><?xml version="1.0" encoding="utf-8"?>
+<p:sld xmlns:a="http://schemas.openxmlformats.org/drawingml/2006/main" xmlns:r="http://schemas.openxmlformats.org/officeDocument/2006/relationships" xmlns:p="http://schemas.openxmlformats.org/presentationml/2006/main">
+  <p:cSld>
+    <p:spTree>
+      <p:nvGrpSpPr>
+        <p:cNvPr id="1" name=""/>
+        <p:cNvGrpSpPr/>
+        <p:nvPr/>
+      </p:nvGrpSpPr>
+      <p:grpSpPr>
+        <a:xfrm>
+          <a:off x="0" y="0"/>
+          <a:ext cx="0" cy="0"/>
+          <a:chOff x="0" y="0"/>
+          <a:chExt cx="0" cy="0"/>
+        </a:xfrm>
+      </p:grpSpPr>
+      <p:pic>
+        <p:nvPicPr>
+          <p:cNvPr id="21" name="Content Placeholder 20" descr="A diagram of a diagram&#10;&#10;Description automatically generated with medium confidence">
+            <a:extLst>
+              <a:ext uri="{FF2B5EF4-FFF2-40B4-BE49-F238E27FC236}">
+                <a16:creationId xmlns:a16="http://schemas.microsoft.com/office/drawing/2014/main" id="{29AE061D-8816-CAF4-D202-9D673262124F}"/>
+              </a:ext>
+            </a:extLst>
+          </p:cNvPr>
+          <p:cNvPicPr>
+            <a:picLocks noGrp="1" noChangeAspect="1"/>
+          </p:cNvPicPr>
+          <p:nvPr>
+            <p:ph idx="1"/>
+          </p:nvPr>
+        </p:nvPicPr>
+        <p:blipFill>
+          <a:blip r:embed="rId2">
+            <a:extLst>
+              <a:ext uri="{28A0092B-C50C-407E-A947-70E740481C1C}">
+                <a14:useLocalDpi xmlns:a14="http://schemas.microsoft.com/office/drawing/2010/main" val="0"/>
+              </a:ext>
+            </a:extLst>
+          </a:blip>
+          <a:stretch>
+            <a:fillRect/>
+          </a:stretch>
+        </p:blipFill>
+        <p:spPr>
+          <a:xfrm>
+            <a:off x="1524000" y="1873915"/>
+            <a:ext cx="9144000" cy="3657600"/>
+          </a:xfrm>
+        </p:spPr>
+      </p:pic>
+      <p:sp>
+        <p:nvSpPr>
+          <p:cNvPr id="22" name="Rectangle 21">
+            <a:extLst>
+              <a:ext uri="{FF2B5EF4-FFF2-40B4-BE49-F238E27FC236}">
+                <a16:creationId xmlns:a16="http://schemas.microsoft.com/office/drawing/2014/main" id="{90967180-EF7E-7725-CFBE-565E7E24F72D}"/>
+              </a:ext>
+            </a:extLst>
+          </p:cNvPr>
+          <p:cNvSpPr/>
+          <p:nvPr/>
+        </p:nvSpPr>
+        <p:spPr>
+          <a:xfrm>
+            <a:off x="2122098" y="2777706"/>
+            <a:ext cx="250166" cy="1492369"/>
+          </a:xfrm>
+          <a:prstGeom prst="rect">
+            <a:avLst/>
+          </a:prstGeom>
+          <a:solidFill>
+            <a:srgbClr val="FF99CC">
+              <a:alpha val="50196"/>
+            </a:srgbClr>
+          </a:solidFill>
+          <a:ln>
+            <a:noFill/>
+          </a:ln>
+        </p:spPr>
+        <p:style>
+          <a:lnRef idx="2">
+            <a:schemeClr val="accent1">
+              <a:shade val="15000"/>
+            </a:schemeClr>
+          </a:lnRef>
+          <a:fillRef idx="1">
+            <a:schemeClr val="accent1"/>
+          </a:fillRef>
+          <a:effectRef idx="0">
+            <a:schemeClr val="accent1"/>
+          </a:effectRef>
+          <a:fontRef idx="minor">
+            <a:schemeClr val="lt1"/>
+          </a:fontRef>
+        </p:style>
+        <p:txBody>
+          <a:bodyPr rtlCol="0" anchor="ctr"/>
+          <a:lstStyle/>
+          <a:p>
+            <a:pPr algn="ctr"/>
+            <a:endParaRPr lang="en-US"/>
+          </a:p>
+        </p:txBody>
+      </p:sp>
+      <p:sp>
+        <p:nvSpPr>
+          <p:cNvPr id="23" name="Rectangle 22">
+            <a:extLst>
+              <a:ext uri="{FF2B5EF4-FFF2-40B4-BE49-F238E27FC236}">
+                <a16:creationId xmlns:a16="http://schemas.microsoft.com/office/drawing/2014/main" id="{1B363F5F-0AAF-461A-108F-E9772C774D9A}"/>
+              </a:ext>
+            </a:extLst>
+          </p:cNvPr>
+          <p:cNvSpPr/>
+          <p:nvPr/>
+        </p:nvSpPr>
+        <p:spPr>
+          <a:xfrm>
+            <a:off x="3973902" y="2777706"/>
+            <a:ext cx="250166" cy="1492369"/>
+          </a:xfrm>
+          <a:prstGeom prst="rect">
+            <a:avLst/>
+          </a:prstGeom>
+          <a:solidFill>
+            <a:srgbClr val="FF99CC">
+              <a:alpha val="50196"/>
+            </a:srgbClr>
+          </a:solidFill>
+          <a:ln>
+            <a:noFill/>
+          </a:ln>
+        </p:spPr>
+        <p:style>
+          <a:lnRef idx="2">
+            <a:schemeClr val="accent1">
+              <a:shade val="15000"/>
+            </a:schemeClr>
+          </a:lnRef>
+          <a:fillRef idx="1">
+            <a:schemeClr val="accent1"/>
+          </a:fillRef>
+          <a:effectRef idx="0">
+            <a:schemeClr val="accent1"/>
+          </a:effectRef>
+          <a:fontRef idx="minor">
+            <a:schemeClr val="lt1"/>
+          </a:fontRef>
+        </p:style>
+        <p:txBody>
+          <a:bodyPr rtlCol="0" anchor="ctr"/>
+          <a:lstStyle/>
+          <a:p>
+            <a:pPr algn="ctr"/>
+            <a:endParaRPr lang="en-US"/>
+          </a:p>
+        </p:txBody>
+      </p:sp>
+      <p:sp>
+        <p:nvSpPr>
+          <p:cNvPr id="24" name="Rectangle 23">
+            <a:extLst>
+              <a:ext uri="{FF2B5EF4-FFF2-40B4-BE49-F238E27FC236}">
+                <a16:creationId xmlns:a16="http://schemas.microsoft.com/office/drawing/2014/main" id="{153CC51C-CCC9-3817-E9E5-C3031675A627}"/>
+              </a:ext>
+            </a:extLst>
+          </p:cNvPr>
+          <p:cNvSpPr/>
+          <p:nvPr/>
+        </p:nvSpPr>
+        <p:spPr>
+          <a:xfrm>
+            <a:off x="4436853" y="2210346"/>
+            <a:ext cx="250166" cy="2758469"/>
+          </a:xfrm>
+          <a:prstGeom prst="rect">
+            <a:avLst/>
+          </a:prstGeom>
+          <a:solidFill>
+            <a:srgbClr val="FF99CC">
+              <a:alpha val="50196"/>
+            </a:srgbClr>
+          </a:solidFill>
+          <a:ln>
+            <a:noFill/>
+          </a:ln>
+        </p:spPr>
+        <p:style>
+          <a:lnRef idx="2">
+            <a:schemeClr val="accent1">
+              <a:shade val="15000"/>
+            </a:schemeClr>
+          </a:lnRef>
+          <a:fillRef idx="1">
+            <a:schemeClr val="accent1"/>
+          </a:fillRef>
+          <a:effectRef idx="0">
+            <a:schemeClr val="accent1"/>
+          </a:effectRef>
+          <a:fontRef idx="minor">
+            <a:schemeClr val="lt1"/>
+          </a:fontRef>
+        </p:style>
+        <p:txBody>
+          <a:bodyPr rtlCol="0" anchor="ctr"/>
+          <a:lstStyle/>
+          <a:p>
+            <a:pPr algn="ctr"/>
+            <a:endParaRPr lang="en-US"/>
+          </a:p>
+        </p:txBody>
+      </p:sp>
+      <p:sp>
+        <p:nvSpPr>
+          <p:cNvPr id="25" name="Rectangle 24">
+            <a:extLst>
+              <a:ext uri="{FF2B5EF4-FFF2-40B4-BE49-F238E27FC236}">
+                <a16:creationId xmlns:a16="http://schemas.microsoft.com/office/drawing/2014/main" id="{FDB35D01-21DC-3D6A-848A-094C6611738D}"/>
+              </a:ext>
+            </a:extLst>
+          </p:cNvPr>
+          <p:cNvSpPr/>
+          <p:nvPr/>
+        </p:nvSpPr>
+        <p:spPr>
+          <a:xfrm>
+            <a:off x="6265653" y="2210345"/>
+            <a:ext cx="250166" cy="2758469"/>
+          </a:xfrm>
+          <a:prstGeom prst="rect">
+            <a:avLst/>
+          </a:prstGeom>
+          <a:solidFill>
+            <a:srgbClr val="FF99CC">
+              <a:alpha val="50196"/>
+            </a:srgbClr>
+          </a:solidFill>
+          <a:ln>
+            <a:noFill/>
+          </a:ln>
+        </p:spPr>
+        <p:style>
+          <a:lnRef idx="2">
+            <a:schemeClr val="accent1">
+              <a:shade val="15000"/>
+            </a:schemeClr>
+          </a:lnRef>
+          <a:fillRef idx="1">
+            <a:schemeClr val="accent1"/>
+          </a:fillRef>
+          <a:effectRef idx="0">
+            <a:schemeClr val="accent1"/>
+          </a:effectRef>
+          <a:fontRef idx="minor">
+            <a:schemeClr val="lt1"/>
+          </a:fontRef>
+        </p:style>
+        <p:txBody>
+          <a:bodyPr rtlCol="0" anchor="ctr"/>
+          <a:lstStyle/>
+          <a:p>
+            <a:pPr algn="ctr"/>
+            <a:endParaRPr lang="en-US"/>
+          </a:p>
+        </p:txBody>
+      </p:sp>
+      <p:sp>
+        <p:nvSpPr>
+          <p:cNvPr id="26" name="Rectangle 25">
+            <a:extLst>
+              <a:ext uri="{FF2B5EF4-FFF2-40B4-BE49-F238E27FC236}">
+                <a16:creationId xmlns:a16="http://schemas.microsoft.com/office/drawing/2014/main" id="{3FCD1E4A-3B6D-B3DB-3D4A-391593DE425D}"/>
+              </a:ext>
+            </a:extLst>
+          </p:cNvPr>
+          <p:cNvSpPr/>
+          <p:nvPr/>
+        </p:nvSpPr>
+        <p:spPr>
+          <a:xfrm>
+            <a:off x="6665342" y="2777705"/>
+            <a:ext cx="250166" cy="1492369"/>
+          </a:xfrm>
+          <a:prstGeom prst="rect">
+            <a:avLst/>
+          </a:prstGeom>
+          <a:solidFill>
+            <a:srgbClr val="FF99CC">
+              <a:alpha val="50196"/>
+            </a:srgbClr>
+          </a:solidFill>
+          <a:ln>
+            <a:noFill/>
+          </a:ln>
+        </p:spPr>
+        <p:style>
+          <a:lnRef idx="2">
+            <a:schemeClr val="accent1">
+              <a:shade val="15000"/>
+            </a:schemeClr>
+          </a:lnRef>
+          <a:fillRef idx="1">
+            <a:schemeClr val="accent1"/>
+          </a:fillRef>
+          <a:effectRef idx="0">
+            <a:schemeClr val="accent1"/>
+          </a:effectRef>
+          <a:fontRef idx="minor">
+            <a:schemeClr val="lt1"/>
+          </a:fontRef>
+        </p:style>
+        <p:txBody>
+          <a:bodyPr rtlCol="0" anchor="ctr"/>
+          <a:lstStyle/>
+          <a:p>
+            <a:pPr algn="ctr"/>
+            <a:endParaRPr lang="en-US"/>
+          </a:p>
+        </p:txBody>
+      </p:sp>
+      <p:sp>
+        <p:nvSpPr>
+          <p:cNvPr id="27" name="Rectangle 26">
+            <a:extLst>
+              <a:ext uri="{FF2B5EF4-FFF2-40B4-BE49-F238E27FC236}">
+                <a16:creationId xmlns:a16="http://schemas.microsoft.com/office/drawing/2014/main" id="{2F550EAE-9D38-7F45-DA4F-9D4A91D59D0C}"/>
+              </a:ext>
+            </a:extLst>
+          </p:cNvPr>
+          <p:cNvSpPr/>
+          <p:nvPr/>
+        </p:nvSpPr>
+        <p:spPr>
+          <a:xfrm>
+            <a:off x="8541588" y="2777704"/>
+            <a:ext cx="250166" cy="1492369"/>
+          </a:xfrm>
+          <a:prstGeom prst="rect">
+            <a:avLst/>
+          </a:prstGeom>
+          <a:solidFill>
+            <a:srgbClr val="FF99CC">
+              <a:alpha val="50196"/>
+            </a:srgbClr>
+          </a:solidFill>
+          <a:ln>
+            <a:noFill/>
+          </a:ln>
+        </p:spPr>
+        <p:style>
+          <a:lnRef idx="2">
+            <a:schemeClr val="accent1">
+              <a:shade val="15000"/>
+            </a:schemeClr>
+          </a:lnRef>
+          <a:fillRef idx="1">
+            <a:schemeClr val="accent1"/>
+          </a:fillRef>
+          <a:effectRef idx="0">
+            <a:schemeClr val="accent1"/>
+          </a:effectRef>
+          <a:fontRef idx="minor">
+            <a:schemeClr val="lt1"/>
+          </a:fontRef>
+        </p:style>
+        <p:txBody>
+          <a:bodyPr rtlCol="0" anchor="ctr"/>
+          <a:lstStyle/>
+          <a:p>
+            <a:pPr algn="ctr"/>
+            <a:endParaRPr lang="en-US"/>
+          </a:p>
+        </p:txBody>
+      </p:sp>
+    </p:spTree>
+    <p:extLst>
+      <p:ext uri="{BB962C8B-B14F-4D97-AF65-F5344CB8AC3E}">
+        <p14:creationId xmlns:p14="http://schemas.microsoft.com/office/powerpoint/2010/main" val="2668449761"/>
+      </p:ext>
+    </p:extLst>
+  </p:cSld>
+  <p:clrMapOvr>
+    <a:masterClrMapping/>
+  </p:clrMapOvr>
+</p:sld>
+</file>
+
 <file path=ppt/theme/theme1.xml><?xml version="1.0" encoding="utf-8"?>
 <a:theme xmlns:a="http://schemas.openxmlformats.org/drawingml/2006/main" name="Office Theme">
   <a:themeElements>

</xml_diff>